<commit_message>
added the logo in svg
</commit_message>
<xml_diff>
--- a/ateam_logo_ppt.pptx
+++ b/ateam_logo_ppt.pptx
@@ -6,7 +6,8 @@
   </p:sldMasterIdLst>
   <p:sldIdLst>
     <p:sldId id="256" r:id="rId2"/>
-    <p:sldId id="257" r:id="rId3"/>
+    <p:sldId id="258" r:id="rId3"/>
+    <p:sldId id="257" r:id="rId4"/>
   </p:sldIdLst>
   <p:sldSz cx="12192000" cy="6858000"/>
   <p:notesSz cx="6858000" cy="9144000"/>
@@ -3469,6 +3470,175 @@
 </file>
 
 <file path=ppt/slides/slide2.xml><?xml version="1.0" encoding="utf-8"?>
+<p:sld xmlns:a="http://schemas.openxmlformats.org/drawingml/2006/main" xmlns:r="http://schemas.openxmlformats.org/officeDocument/2006/relationships" xmlns:p="http://schemas.openxmlformats.org/presentationml/2006/main">
+  <p:cSld>
+    <p:spTree>
+      <p:nvGrpSpPr>
+        <p:cNvPr id="1" name="">
+          <a:extLst>
+            <a:ext uri="{FF2B5EF4-FFF2-40B4-BE49-F238E27FC236}">
+              <a16:creationId xmlns:a16="http://schemas.microsoft.com/office/drawing/2014/main" id="{8CB281E8-923F-9393-DF2D-EA20A6FE01D9}"/>
+            </a:ext>
+          </a:extLst>
+        </p:cNvPr>
+        <p:cNvGrpSpPr/>
+        <p:nvPr/>
+      </p:nvGrpSpPr>
+      <p:grpSpPr>
+        <a:xfrm>
+          <a:off x="0" y="0"/>
+          <a:ext cx="0" cy="0"/>
+          <a:chOff x="0" y="0"/>
+          <a:chExt cx="0" cy="0"/>
+        </a:xfrm>
+      </p:grpSpPr>
+      <p:pic>
+        <p:nvPicPr>
+          <p:cNvPr id="5" name="Picture 4" descr="A blue and white circular object with a brain and circuit board&#10;&#10;AI-generated content may be incorrect.">
+            <a:extLst>
+              <a:ext uri="{FF2B5EF4-FFF2-40B4-BE49-F238E27FC236}">
+                <a16:creationId xmlns:a16="http://schemas.microsoft.com/office/drawing/2014/main" id="{51071459-210F-4E6A-A697-B812A3FC4824}"/>
+              </a:ext>
+            </a:extLst>
+          </p:cNvPr>
+          <p:cNvPicPr>
+            <a:picLocks noChangeAspect="1"/>
+          </p:cNvPicPr>
+          <p:nvPr/>
+        </p:nvPicPr>
+        <p:blipFill rotWithShape="1">
+          <a:blip r:embed="rId2"/>
+          <a:srcRect/>
+          <a:stretch>
+            <a:fillRect/>
+          </a:stretch>
+        </p:blipFill>
+        <p:spPr>
+          <a:xfrm>
+            <a:off x="3674087" y="871151"/>
+            <a:ext cx="5115674" cy="5115697"/>
+          </a:xfrm>
+          <a:prstGeom prst="ellipse">
+            <a:avLst/>
+          </a:prstGeom>
+        </p:spPr>
+      </p:pic>
+      <p:sp>
+        <p:nvSpPr>
+          <p:cNvPr id="7" name="Oval 6">
+            <a:extLst>
+              <a:ext uri="{FF2B5EF4-FFF2-40B4-BE49-F238E27FC236}">
+                <a16:creationId xmlns:a16="http://schemas.microsoft.com/office/drawing/2014/main" id="{D0866414-B12C-C92A-9D8B-1AB60B45E4A0}"/>
+              </a:ext>
+            </a:extLst>
+          </p:cNvPr>
+          <p:cNvSpPr/>
+          <p:nvPr/>
+        </p:nvSpPr>
+        <p:spPr>
+          <a:xfrm>
+            <a:off x="3138617" y="506627"/>
+            <a:ext cx="5881816" cy="5857103"/>
+          </a:xfrm>
+          <a:prstGeom prst="ellipse">
+            <a:avLst/>
+          </a:prstGeom>
+          <a:noFill/>
+          <a:ln>
+            <a:noFill/>
+          </a:ln>
+        </p:spPr>
+        <p:style>
+          <a:lnRef idx="2">
+            <a:schemeClr val="accent1">
+              <a:shade val="15000"/>
+            </a:schemeClr>
+          </a:lnRef>
+          <a:fillRef idx="1">
+            <a:schemeClr val="accent1"/>
+          </a:fillRef>
+          <a:effectRef idx="0">
+            <a:schemeClr val="accent1"/>
+          </a:effectRef>
+          <a:fontRef idx="minor">
+            <a:schemeClr val="lt1"/>
+          </a:fontRef>
+        </p:style>
+        <p:txBody>
+          <a:bodyPr rtlCol="0" anchor="ctr"/>
+          <a:lstStyle/>
+          <a:p>
+            <a:pPr algn="ctr"/>
+            <a:endParaRPr lang="en-US"/>
+          </a:p>
+        </p:txBody>
+      </p:sp>
+      <p:sp>
+        <p:nvSpPr>
+          <p:cNvPr id="9" name="TextBox 8">
+            <a:extLst>
+              <a:ext uri="{FF2B5EF4-FFF2-40B4-BE49-F238E27FC236}">
+                <a16:creationId xmlns:a16="http://schemas.microsoft.com/office/drawing/2014/main" id="{95072715-F6E8-32AD-D878-25ADD6B770FD}"/>
+              </a:ext>
+            </a:extLst>
+          </p:cNvPr>
+          <p:cNvSpPr txBox="1"/>
+          <p:nvPr/>
+        </p:nvSpPr>
+        <p:spPr>
+          <a:xfrm>
+            <a:off x="4266169" y="305067"/>
+            <a:ext cx="3024317" cy="6247864"/>
+          </a:xfrm>
+          <a:prstGeom prst="rect">
+            <a:avLst/>
+          </a:prstGeom>
+          <a:noFill/>
+          <a:ln w="0">
+            <a:noFill/>
+          </a:ln>
+        </p:spPr>
+        <p:txBody>
+          <a:bodyPr wrap="square" rtlCol="0">
+            <a:spAutoFit/>
+          </a:bodyPr>
+          <a:lstStyle/>
+          <a:p>
+            <a:r>
+              <a:rPr lang="en-US" sz="40000" dirty="0">
+                <a:ln w="50800">
+                  <a:solidFill>
+                    <a:schemeClr val="accent1">
+                      <a:shade val="15000"/>
+                    </a:schemeClr>
+                  </a:solidFill>
+                </a:ln>
+                <a:solidFill>
+                  <a:srgbClr val="F0BE7D"/>
+                </a:solidFill>
+                <a:latin typeface="STXingkai" panose="02010800040101010101" pitchFamily="2" charset="-122"/>
+                <a:ea typeface="STXingkai" panose="02010800040101010101" pitchFamily="2" charset="-122"/>
+                <a:cs typeface="Apple Chancery" panose="03020702040506060504" pitchFamily="66" charset="-79"/>
+              </a:rPr>
+              <a:t>A</a:t>
+            </a:r>
+          </a:p>
+        </p:txBody>
+      </p:sp>
+    </p:spTree>
+    <p:extLst>
+      <p:ext uri="{BB962C8B-B14F-4D97-AF65-F5344CB8AC3E}">
+        <p14:creationId xmlns:p14="http://schemas.microsoft.com/office/powerpoint/2010/main" val="3722182351"/>
+      </p:ext>
+    </p:extLst>
+  </p:cSld>
+  <p:clrMapOvr>
+    <a:masterClrMapping/>
+  </p:clrMapOvr>
+</p:sld>
+</file>
+
+<file path=ppt/slides/slide3.xml><?xml version="1.0" encoding="utf-8"?>
 <p:sld xmlns:a="http://schemas.openxmlformats.org/drawingml/2006/main" xmlns:r="http://schemas.openxmlformats.org/officeDocument/2006/relationships" xmlns:p="http://schemas.openxmlformats.org/presentationml/2006/main">
   <p:cSld>
     <p:spTree>

</xml_diff>